<commit_message>
pratice files for L1
</commit_message>
<xml_diff>
--- a/vb_net/L1 Introduction.pptx
+++ b/vb_net/L1 Introduction.pptx
@@ -351,7 +351,7 @@
           <a:p>
             <a:fld id="{11EAACC7-3B3F-47D1-959A-EF58926E955E}" type="datetimeFigureOut">
               <a:rPr lang="en-US" smtClean="0"/>
-              <a:t>8/1/2021</a:t>
+              <a:t>12/23/2021</a:t>
             </a:fld>
             <a:endParaRPr lang="en-US"/>
           </a:p>
@@ -689,7 +689,7 @@
           <a:p>
             <a:fld id="{11EAACC7-3B3F-47D1-959A-EF58926E955E}" type="datetimeFigureOut">
               <a:rPr lang="en-US" smtClean="0"/>
-              <a:t>8/1/2021</a:t>
+              <a:t>12/23/2021</a:t>
             </a:fld>
             <a:endParaRPr lang="en-US"/>
           </a:p>
@@ -1090,7 +1090,7 @@
           <a:p>
             <a:fld id="{11EAACC7-3B3F-47D1-959A-EF58926E955E}" type="datetimeFigureOut">
               <a:rPr lang="en-US" smtClean="0"/>
-              <a:t>8/1/2021</a:t>
+              <a:t>12/23/2021</a:t>
             </a:fld>
             <a:endParaRPr lang="en-US"/>
           </a:p>
@@ -1426,7 +1426,7 @@
           <a:p>
             <a:fld id="{11EAACC7-3B3F-47D1-959A-EF58926E955E}" type="datetimeFigureOut">
               <a:rPr lang="en-US" smtClean="0"/>
-              <a:t>8/1/2021</a:t>
+              <a:t>12/23/2021</a:t>
             </a:fld>
             <a:endParaRPr lang="en-US"/>
           </a:p>
@@ -1746,7 +1746,7 @@
           <a:p>
             <a:fld id="{11EAACC7-3B3F-47D1-959A-EF58926E955E}" type="datetimeFigureOut">
               <a:rPr lang="en-US" smtClean="0"/>
-              <a:t>8/1/2021</a:t>
+              <a:t>12/23/2021</a:t>
             </a:fld>
             <a:endParaRPr lang="en-US"/>
           </a:p>
@@ -2142,7 +2142,7 @@
           <a:p>
             <a:fld id="{11EAACC7-3B3F-47D1-959A-EF58926E955E}" type="datetimeFigureOut">
               <a:rPr lang="en-US" smtClean="0"/>
-              <a:t>8/1/2021</a:t>
+              <a:t>12/23/2021</a:t>
             </a:fld>
             <a:endParaRPr lang="en-US"/>
           </a:p>
@@ -2399,7 +2399,7 @@
           <a:p>
             <a:fld id="{11EAACC7-3B3F-47D1-959A-EF58926E955E}" type="datetimeFigureOut">
               <a:rPr lang="en-US" smtClean="0"/>
-              <a:t>8/1/2021</a:t>
+              <a:t>12/23/2021</a:t>
             </a:fld>
             <a:endParaRPr lang="en-US"/>
           </a:p>
@@ -2661,7 +2661,7 @@
           <a:p>
             <a:fld id="{11EAACC7-3B3F-47D1-959A-EF58926E955E}" type="datetimeFigureOut">
               <a:rPr lang="en-US" smtClean="0"/>
-              <a:t>8/1/2021</a:t>
+              <a:t>12/23/2021</a:t>
             </a:fld>
             <a:endParaRPr lang="en-US"/>
           </a:p>
@@ -2923,7 +2923,7 @@
           <a:p>
             <a:fld id="{11EAACC7-3B3F-47D1-959A-EF58926E955E}" type="datetimeFigureOut">
               <a:rPr lang="en-US" smtClean="0"/>
-              <a:t>8/1/2021</a:t>
+              <a:t>12/23/2021</a:t>
             </a:fld>
             <a:endParaRPr lang="en-US" dirty="0"/>
           </a:p>
@@ -3252,7 +3252,7 @@
           <a:p>
             <a:fld id="{11EAACC7-3B3F-47D1-959A-EF58926E955E}" type="datetimeFigureOut">
               <a:rPr lang="en-US" smtClean="0"/>
-              <a:t>8/1/2021</a:t>
+              <a:t>12/23/2021</a:t>
             </a:fld>
             <a:endParaRPr lang="en-US"/>
           </a:p>
@@ -3575,7 +3575,7 @@
           <a:p>
             <a:fld id="{11EAACC7-3B3F-47D1-959A-EF58926E955E}" type="datetimeFigureOut">
               <a:rPr lang="en-US" smtClean="0"/>
-              <a:t>8/1/2021</a:t>
+              <a:t>12/23/2021</a:t>
             </a:fld>
             <a:endParaRPr lang="en-US"/>
           </a:p>
@@ -4032,7 +4032,7 @@
           <a:p>
             <a:fld id="{11EAACC7-3B3F-47D1-959A-EF58926E955E}" type="datetimeFigureOut">
               <a:rPr lang="en-US" smtClean="0"/>
-              <a:t>8/1/2021</a:t>
+              <a:t>12/23/2021</a:t>
             </a:fld>
             <a:endParaRPr lang="en-US"/>
           </a:p>
@@ -4237,7 +4237,7 @@
           <a:p>
             <a:fld id="{11EAACC7-3B3F-47D1-959A-EF58926E955E}" type="datetimeFigureOut">
               <a:rPr lang="en-US" smtClean="0"/>
-              <a:t>8/1/2021</a:t>
+              <a:t>12/23/2021</a:t>
             </a:fld>
             <a:endParaRPr lang="en-US"/>
           </a:p>
@@ -4414,7 +4414,7 @@
           <a:p>
             <a:fld id="{11EAACC7-3B3F-47D1-959A-EF58926E955E}" type="datetimeFigureOut">
               <a:rPr lang="en-US" smtClean="0"/>
-              <a:t>8/1/2021</a:t>
+              <a:t>12/23/2021</a:t>
             </a:fld>
             <a:endParaRPr lang="en-US"/>
           </a:p>
@@ -4747,7 +4747,7 @@
           <a:p>
             <a:fld id="{11EAACC7-3B3F-47D1-959A-EF58926E955E}" type="datetimeFigureOut">
               <a:rPr lang="en-US" smtClean="0"/>
-              <a:t>8/1/2021</a:t>
+              <a:t>12/23/2021</a:t>
             </a:fld>
             <a:endParaRPr lang="en-US"/>
           </a:p>
@@ -5092,7 +5092,7 @@
           <a:p>
             <a:fld id="{11EAACC7-3B3F-47D1-959A-EF58926E955E}" type="datetimeFigureOut">
               <a:rPr lang="en-US" smtClean="0"/>
-              <a:t>8/1/2021</a:t>
+              <a:t>12/23/2021</a:t>
             </a:fld>
             <a:endParaRPr lang="en-US"/>
           </a:p>
@@ -7209,7 +7209,7 @@
           <a:p>
             <a:fld id="{11EAACC7-3B3F-47D1-959A-EF58926E955E}" type="datetimeFigureOut">
               <a:rPr lang="en-US" smtClean="0"/>
-              <a:t>8/1/2021</a:t>
+              <a:t>12/23/2021</a:t>
             </a:fld>
             <a:endParaRPr lang="en-US"/>
           </a:p>

</xml_diff>